<commit_message>
Cambio diapo y Avd por Av.
</commit_message>
<xml_diff>
--- a/PRESENTACION NETLOGO.pptx
+++ b/PRESENTACION NETLOGO.pptx
@@ -218,7 +218,7 @@
               <a:cs typeface="+mn-cs"/>
             </a:defRPr>
           </a:pPr>
-          <a:endParaRPr lang="es-EC"/>
+          <a:endParaRPr lang="es-ES"/>
         </a:p>
       </c:txPr>
     </c:title>
@@ -552,12 +552,13 @@
               <a:cs typeface="+mn-cs"/>
             </a:defRPr>
           </a:pPr>
-          <a:endParaRPr lang="es-EC"/>
+          <a:endParaRPr lang="es-ES"/>
         </a:p>
       </c:txPr>
     </c:legend>
     <c:plotVisOnly val="1"/>
     <c:dispBlanksAs val="gap"/>
+    <c:showDLblsOverMax val="0"/>
     <c:extLst>
       <c:ext xmlns:c16r3="http://schemas.microsoft.com/office/drawing/2017/03/chart" uri="{56B9EC1D-385E-4148-901F-78D8002777C0}">
         <c16r3:dataDisplayOptions16>
@@ -565,7 +566,6 @@
         </c16r3:dataDisplayOptions16>
       </c:ext>
     </c:extLst>
-    <c:showDLblsOverMax val="0"/>
   </c:chart>
   <c:spPr>
     <a:noFill/>
@@ -581,7 +581,7 @@
       <a:pPr>
         <a:defRPr/>
       </a:pPr>
-      <a:endParaRPr lang="es-EC"/>
+      <a:endParaRPr lang="es-ES"/>
     </a:p>
   </c:txPr>
   <c:externalData r:id="rId3">
@@ -18751,47 +18751,36 @@
         </p:spPr>
         <p:txBody>
           <a:bodyPr rtlCol="0">
-            <a:normAutofit fontScale="70000" lnSpcReduction="20000"/>
+            <a:normAutofit fontScale="92500" lnSpcReduction="20000"/>
           </a:bodyPr>
           <a:lstStyle/>
           <a:p>
-            <a:pPr marL="0" indent="0" algn="just">
-              <a:buNone/>
-            </a:pPr>
             <a:r>
               <a:rPr lang="es-ES" dirty="0"/>
               <a:t>En las sociedades modernas el movilizarse de un lugar a otro se ha convertido en parte fundamental de la convivencia y el desarrollo social. </a:t>
             </a:r>
-            <a:endParaRPr lang="es-EC" dirty="0"/>
           </a:p>
           <a:p>
-            <a:pPr marL="0" indent="0" algn="just">
-              <a:buNone/>
-            </a:pPr>
             <a:r>
               <a:rPr lang="es-ES" dirty="0"/>
-              <a:t>Se puede identificar un problema en común en cuanto tránsito y transporte, esto puede ser producto del crecimiento del número de vehículos, la falta de infraestructura vial, el mal estado de la misma y un crecimiento urbano descontrolado. </a:t>
+              <a:t>Se puede identificar un problema en común en cuanto tránsito y transporte.</a:t>
             </a:r>
-            <a:endParaRPr lang="es-EC" dirty="0"/>
           </a:p>
           <a:p>
-            <a:pPr marL="0" indent="0" algn="just">
-              <a:buNone/>
-            </a:pPr>
             <a:r>
               <a:rPr lang="es-ES" dirty="0"/>
-              <a:t>Las congestiones vehiculares producidas en las horas pico (horas de mayor flujo vehicular), se deben a la necesidad de las personas de llegar a sus sitios de trabajo, vivienda o estudio, estos embotellamientos se presentan debido al gran número de vehículos que circulan por las vías y la falta de planes de movilidad, ocasionando malestar entre los conductores, usuarios de transporte público y peatones.</a:t>
+              <a:t>Las congestiones vehiculares producidas en las horas pico (horas de mayor flujo vehicular), se deben a la necesidad de las personas de llegar a sus sitios de trabajo, vivienda o estudio.</a:t>
             </a:r>
-            <a:endParaRPr lang="es-EC" dirty="0"/>
           </a:p>
           <a:p>
             <a:pPr marL="0" lvl="0" indent="0" algn="just" rtl="0">
               <a:buNone/>
             </a:pPr>
             <a:r>
-              <a:rPr lang="es-ES" dirty="0"/>
+              <a:rPr lang="es-ES" dirty="0" smtClean="0"/>
               <a:t> </a:t>
             </a:r>
+            <a:endParaRPr lang="es-ES" dirty="0"/>
           </a:p>
         </p:txBody>
       </p:sp>
@@ -19042,7 +19031,7 @@
         </p:spPr>
         <p:txBody>
           <a:bodyPr rtlCol="0">
-            <a:normAutofit fontScale="77500" lnSpcReduction="20000"/>
+            <a:normAutofit fontScale="85000" lnSpcReduction="20000"/>
           </a:bodyPr>
           <a:lstStyle/>
           <a:p>

</xml_diff>